<commit_message>
Added weighted regression to results
</commit_message>
<xml_diff>
--- a/doc/ADS Project 4 Presentation.pptx
+++ b/doc/ADS Project 4 Presentation.pptx
@@ -6779,7 +6779,7 @@
             <p:ph idx="1"/>
             <p:extLst>
               <p:ext uri="{D42A27DB-BD31-4B8C-83A1-F6EECF244321}">
-                <p14:modId xmlns:p14="http://schemas.microsoft.com/office/powerpoint/2010/main" val="1665930179"/>
+                <p14:modId xmlns:p14="http://schemas.microsoft.com/office/powerpoint/2010/main" val="3164779845"/>
               </p:ext>
             </p:extLst>
           </p:nvPr>
@@ -7152,7 +7152,10 @@
                     <a:bodyPr/>
                     <a:lstStyle/>
                     <a:p>
-                      <a:endParaRPr lang="en-US"/>
+                      <a:r>
+                        <a:rPr lang="en-US" dirty="0"/>
+                        <a:t>4.369954</a:t>
+                      </a:r>
                     </a:p>
                   </a:txBody>
                   <a:tcPr/>
@@ -7162,7 +7165,10 @@
                     <a:bodyPr/>
                     <a:lstStyle/>
                     <a:p>
-                      <a:endParaRPr lang="en-US"/>
+                      <a:r>
+                        <a:rPr lang="en-US" dirty="0"/>
+                        <a:t>0.18272302</a:t>
+                      </a:r>
                     </a:p>
                   </a:txBody>
                   <a:tcPr/>
@@ -7172,7 +7178,10 @@
                     <a:bodyPr/>
                     <a:lstStyle/>
                     <a:p>
-                      <a:endParaRPr lang="en-US"/>
+                      <a:r>
+                        <a:rPr lang="en-US" dirty="0"/>
+                        <a:t>-52.62841</a:t>
+                      </a:r>
                     </a:p>
                   </a:txBody>
                   <a:tcPr/>
@@ -7182,7 +7191,10 @@
                     <a:bodyPr/>
                     <a:lstStyle/>
                     <a:p>
-                      <a:endParaRPr lang="en-US"/>
+                      <a:r>
+                        <a:rPr lang="en-US" dirty="0"/>
+                        <a:t>0.04108073</a:t>
+                      </a:r>
                     </a:p>
                   </a:txBody>
                   <a:tcPr/>
@@ -7229,7 +7241,10 @@
                     <a:bodyPr/>
                     <a:lstStyle/>
                     <a:p>
-                      <a:endParaRPr lang="en-US"/>
+                      <a:r>
+                        <a:rPr lang="en-US" dirty="0"/>
+                        <a:t>2.371125</a:t>
+                      </a:r>
                     </a:p>
                   </a:txBody>
                   <a:tcPr/>
@@ -7239,7 +7254,10 @@
                     <a:bodyPr/>
                     <a:lstStyle/>
                     <a:p>
-                      <a:endParaRPr lang="en-US"/>
+                      <a:r>
+                        <a:rPr lang="en-US" dirty="0"/>
+                        <a:t>0.02252324</a:t>
+                      </a:r>
                     </a:p>
                   </a:txBody>
                   <a:tcPr/>
@@ -7249,7 +7267,10 @@
                     <a:bodyPr/>
                     <a:lstStyle/>
                     <a:p>
-                      <a:endParaRPr lang="en-US"/>
+                      <a:r>
+                        <a:rPr lang="en-US" dirty="0"/>
+                        <a:t>-53.38666</a:t>
+                      </a:r>
                     </a:p>
                   </a:txBody>
                   <a:tcPr/>
@@ -7259,7 +7280,10 @@
                     <a:bodyPr/>
                     <a:lstStyle/>
                     <a:p>
-                      <a:endParaRPr lang="en-US"/>
+                      <a:r>
+                        <a:rPr lang="en-US" dirty="0"/>
+                        <a:t>0.02709601</a:t>
+                      </a:r>
                     </a:p>
                   </a:txBody>
                   <a:tcPr/>
@@ -7425,7 +7449,7 @@
             <p:ph idx="1"/>
             <p:extLst>
               <p:ext uri="{D42A27DB-BD31-4B8C-83A1-F6EECF244321}">
-                <p14:modId xmlns:p14="http://schemas.microsoft.com/office/powerpoint/2010/main" val="801634835"/>
+                <p14:modId xmlns:p14="http://schemas.microsoft.com/office/powerpoint/2010/main" val="2177859053"/>
               </p:ext>
             </p:extLst>
           </p:nvPr>
@@ -7792,7 +7816,10 @@
                     <a:bodyPr/>
                     <a:lstStyle/>
                     <a:p>
-                      <a:endParaRPr lang="en-US"/>
+                      <a:r>
+                        <a:rPr lang="en-US" dirty="0"/>
+                        <a:t>0.050</a:t>
+                      </a:r>
                     </a:p>
                   </a:txBody>
                   <a:tcPr/>
@@ -7802,7 +7829,10 @@
                     <a:bodyPr/>
                     <a:lstStyle/>
                     <a:p>
-                      <a:endParaRPr lang="en-US"/>
+                      <a:r>
+                        <a:rPr lang="en-US" dirty="0"/>
+                        <a:t>0.026</a:t>
+                      </a:r>
                     </a:p>
                   </a:txBody>
                   <a:tcPr/>
@@ -7812,7 +7842,10 @@
                     <a:bodyPr/>
                     <a:lstStyle/>
                     <a:p>
-                      <a:endParaRPr lang="en-US"/>
+                      <a:r>
+                        <a:rPr lang="en-US" dirty="0"/>
+                        <a:t>0.138</a:t>
+                      </a:r>
                     </a:p>
                   </a:txBody>
                   <a:tcPr/>
@@ -7822,7 +7855,7 @@
                     <a:bodyPr/>
                     <a:lstStyle/>
                     <a:p>
-                      <a:endParaRPr lang="en-US"/>
+                      <a:endParaRPr lang="en-US" dirty="0"/>
                     </a:p>
                   </a:txBody>
                   <a:tcPr/>
@@ -7869,7 +7902,10 @@
                     <a:bodyPr/>
                     <a:lstStyle/>
                     <a:p>
-                      <a:endParaRPr lang="en-US"/>
+                      <a:r>
+                        <a:rPr lang="en-US" dirty="0"/>
+                        <a:t>0.034</a:t>
+                      </a:r>
                     </a:p>
                   </a:txBody>
                   <a:tcPr/>
@@ -7879,7 +7915,10 @@
                     <a:bodyPr/>
                     <a:lstStyle/>
                     <a:p>
-                      <a:endParaRPr lang="en-US"/>
+                      <a:r>
+                        <a:rPr lang="en-US" dirty="0"/>
+                        <a:t>0.007</a:t>
+                      </a:r>
                     </a:p>
                   </a:txBody>
                   <a:tcPr/>
@@ -7889,7 +7928,10 @@
                     <a:bodyPr/>
                     <a:lstStyle/>
                     <a:p>
-                      <a:endParaRPr lang="en-US"/>
+                      <a:r>
+                        <a:rPr lang="en-US" dirty="0"/>
+                        <a:t>0.150</a:t>
+                      </a:r>
                     </a:p>
                   </a:txBody>
                   <a:tcPr/>
@@ -8044,7 +8086,7 @@
           <a:p>
             <a:r>
               <a:rPr lang="en-US" dirty="0"/>
-              <a:t>Empirical Time complexity results</a:t>
+              <a:t>Empirical Time complexity results (Seconds)</a:t>
             </a:r>
           </a:p>
         </p:txBody>
@@ -8065,7 +8107,7 @@
             <p:ph idx="1"/>
             <p:extLst>
               <p:ext uri="{D42A27DB-BD31-4B8C-83A1-F6EECF244321}">
-                <p14:modId xmlns:p14="http://schemas.microsoft.com/office/powerpoint/2010/main" val="3018638305"/>
+                <p14:modId xmlns:p14="http://schemas.microsoft.com/office/powerpoint/2010/main" val="226162743"/>
               </p:ext>
             </p:extLst>
           </p:nvPr>
@@ -8247,7 +8289,7 @@
                     <a:bodyPr/>
                     <a:lstStyle/>
                     <a:p>
-                      <a:endParaRPr lang="en-US"/>
+                      <a:endParaRPr lang="en-US" dirty="0"/>
                     </a:p>
                   </a:txBody>
                   <a:tcPr/>
@@ -8316,7 +8358,7 @@
                     <a:bodyPr/>
                     <a:lstStyle/>
                     <a:p>
-                      <a:endParaRPr lang="en-US"/>
+                      <a:endParaRPr lang="en-US" dirty="0"/>
                     </a:p>
                   </a:txBody>
                   <a:tcPr/>
@@ -8373,10 +8415,9 @@
                     <a:lstStyle/>
                     <a:p>
                       <a:r>
-                        <a:rPr lang="en-US"/>
+                        <a:rPr lang="en-US" dirty="0"/>
                         <a:t>2.857</a:t>
                       </a:r>
-                      <a:endParaRPr lang="en-US" dirty="0"/>
                     </a:p>
                   </a:txBody>
                   <a:tcPr/>
@@ -8386,7 +8427,7 @@
                     <a:bodyPr/>
                     <a:lstStyle/>
                     <a:p>
-                      <a:endParaRPr lang="en-US"/>
+                      <a:endParaRPr lang="en-US" dirty="0"/>
                     </a:p>
                   </a:txBody>
                   <a:tcPr/>
@@ -8433,7 +8474,10 @@
                     <a:bodyPr/>
                     <a:lstStyle/>
                     <a:p>
-                      <a:endParaRPr lang="en-US"/>
+                      <a:r>
+                        <a:rPr lang="en-US" dirty="0"/>
+                        <a:t>1.149</a:t>
+                      </a:r>
                     </a:p>
                   </a:txBody>
                   <a:tcPr/>
@@ -8443,7 +8487,10 @@
                     <a:bodyPr/>
                     <a:lstStyle/>
                     <a:p>
-                      <a:endParaRPr lang="en-US"/>
+                      <a:r>
+                        <a:rPr lang="en-US" dirty="0"/>
+                        <a:t>0.007</a:t>
+                      </a:r>
                     </a:p>
                   </a:txBody>
                   <a:tcPr/>
@@ -8453,7 +8500,10 @@
                     <a:bodyPr/>
                     <a:lstStyle/>
                     <a:p>
-                      <a:endParaRPr lang="en-US"/>
+                      <a:r>
+                        <a:rPr lang="en-US" dirty="0"/>
+                        <a:t>4.341</a:t>
+                      </a:r>
                     </a:p>
                   </a:txBody>
                   <a:tcPr/>
@@ -8510,7 +8560,10 @@
                     <a:bodyPr/>
                     <a:lstStyle/>
                     <a:p>
-                      <a:endParaRPr lang="en-US"/>
+                      <a:r>
+                        <a:rPr lang="en-US" dirty="0"/>
+                        <a:t>0.436</a:t>
+                      </a:r>
                     </a:p>
                   </a:txBody>
                   <a:tcPr/>
@@ -8520,7 +8573,10 @@
                     <a:bodyPr/>
                     <a:lstStyle/>
                     <a:p>
-                      <a:endParaRPr lang="en-US"/>
+                      <a:r>
+                        <a:rPr lang="en-US" dirty="0"/>
+                        <a:t>0.027</a:t>
+                      </a:r>
                     </a:p>
                   </a:txBody>
                   <a:tcPr/>
@@ -8530,7 +8586,10 @@
                     <a:bodyPr/>
                     <a:lstStyle/>
                     <a:p>
-                      <a:endParaRPr lang="en-US"/>
+                      <a:r>
+                        <a:rPr lang="en-US" dirty="0"/>
+                        <a:t>4.072</a:t>
+                      </a:r>
                     </a:p>
                   </a:txBody>
                   <a:tcPr/>
@@ -8570,7 +8629,7 @@
                     <a:bodyPr/>
                     <a:lstStyle/>
                     <a:p>
-                      <a:endParaRPr lang="en-US"/>
+                      <a:endParaRPr lang="en-US" dirty="0"/>
                     </a:p>
                   </a:txBody>
                   <a:tcPr/>

</xml_diff>

<commit_message>
added A7 results to presentation
</commit_message>
<xml_diff>
--- a/doc/ADS Project 4 Presentation.pptx
+++ b/doc/ADS Project 4 Presentation.pptx
@@ -6779,7 +6779,7 @@
             <p:ph idx="1"/>
             <p:extLst>
               <p:ext uri="{D42A27DB-BD31-4B8C-83A1-F6EECF244321}">
-                <p14:modId xmlns:p14="http://schemas.microsoft.com/office/powerpoint/2010/main" val="3164779845"/>
+                <p14:modId xmlns:p14="http://schemas.microsoft.com/office/powerpoint/2010/main" val="1654503185"/>
               </p:ext>
             </p:extLst>
           </p:nvPr>
@@ -7313,7 +7313,10 @@
                     <a:bodyPr/>
                     <a:lstStyle/>
                     <a:p>
-                      <a:endParaRPr lang="en-US"/>
+                      <a:r>
+                        <a:rPr lang="en-US" dirty="0"/>
+                        <a:t>2.090175</a:t>
+                      </a:r>
                     </a:p>
                   </a:txBody>
                   <a:tcPr/>
@@ -7323,7 +7326,10 @@
                     <a:bodyPr/>
                     <a:lstStyle/>
                     <a:p>
-                      <a:endParaRPr lang="en-US"/>
+                      <a:r>
+                        <a:rPr lang="en-US" dirty="0"/>
+                        <a:t>6.028979e-06</a:t>
+                      </a:r>
                     </a:p>
                   </a:txBody>
                   <a:tcPr/>
@@ -7333,7 +7339,10 @@
                     <a:bodyPr/>
                     <a:lstStyle/>
                     <a:p>
-                      <a:endParaRPr lang="en-US"/>
+                      <a:r>
+                        <a:rPr lang="en-US" dirty="0"/>
+                        <a:t>-57.95906</a:t>
+                      </a:r>
                     </a:p>
                   </a:txBody>
                   <a:tcPr/>
@@ -7343,7 +7352,10 @@
                     <a:bodyPr/>
                     <a:lstStyle/>
                     <a:p>
-                      <a:endParaRPr lang="en-US" dirty="0"/>
+                      <a:r>
+                        <a:rPr lang="en-US" dirty="0"/>
+                        <a:t>-0.05723466</a:t>
+                      </a:r>
                     </a:p>
                   </a:txBody>
                   <a:tcPr/>
@@ -7449,14 +7461,14 @@
             <p:ph idx="1"/>
             <p:extLst>
               <p:ext uri="{D42A27DB-BD31-4B8C-83A1-F6EECF244321}">
-                <p14:modId xmlns:p14="http://schemas.microsoft.com/office/powerpoint/2010/main" val="2177859053"/>
+                <p14:modId xmlns:p14="http://schemas.microsoft.com/office/powerpoint/2010/main" val="3472626673"/>
               </p:ext>
             </p:extLst>
           </p:nvPr>
         </p:nvGraphicFramePr>
         <p:xfrm>
           <a:off x="663431" y="1519084"/>
-          <a:ext cx="11002540" cy="4689984"/>
+          <a:ext cx="11002542" cy="4723027"/>
         </p:xfrm>
         <a:graphic>
           <a:graphicData uri="http://schemas.openxmlformats.org/drawingml/2006/table">
@@ -7465,35 +7477,42 @@
                 <a:tableStyleId>{5C22544A-7EE6-4342-B048-85BDC9FD1C3A}</a:tableStyleId>
               </a:tblPr>
               <a:tblGrid>
-                <a:gridCol w="2200508">
+                <a:gridCol w="1833757">
                   <a:extLst>
                     <a:ext uri="{9D8B030D-6E8A-4147-A177-3AD203B41FA5}">
                       <a16:colId xmlns:a16="http://schemas.microsoft.com/office/drawing/2014/main" val="4172883840"/>
                     </a:ext>
                   </a:extLst>
                 </a:gridCol>
-                <a:gridCol w="2200508">
+                <a:gridCol w="1833757">
                   <a:extLst>
                     <a:ext uri="{9D8B030D-6E8A-4147-A177-3AD203B41FA5}">
                       <a16:colId xmlns:a16="http://schemas.microsoft.com/office/drawing/2014/main" val="1001523375"/>
                     </a:ext>
                   </a:extLst>
                 </a:gridCol>
-                <a:gridCol w="2200508">
+                <a:gridCol w="1833757">
                   <a:extLst>
                     <a:ext uri="{9D8B030D-6E8A-4147-A177-3AD203B41FA5}">
                       <a16:colId xmlns:a16="http://schemas.microsoft.com/office/drawing/2014/main" val="2616206518"/>
                     </a:ext>
                   </a:extLst>
                 </a:gridCol>
-                <a:gridCol w="2200508">
+                <a:gridCol w="1833757">
                   <a:extLst>
                     <a:ext uri="{9D8B030D-6E8A-4147-A177-3AD203B41FA5}">
                       <a16:colId xmlns:a16="http://schemas.microsoft.com/office/drawing/2014/main" val="2559281583"/>
                     </a:ext>
                   </a:extLst>
                 </a:gridCol>
-                <a:gridCol w="2200508">
+                <a:gridCol w="1833757">
+                  <a:extLst>
+                    <a:ext uri="{9D8B030D-6E8A-4147-A177-3AD203B41FA5}">
+                      <a16:colId xmlns:a16="http://schemas.microsoft.com/office/drawing/2014/main" val="1857080764"/>
+                    </a:ext>
+                  </a:extLst>
+                </a:gridCol>
+                <a:gridCol w="1833757">
                   <a:extLst>
                     <a:ext uri="{9D8B030D-6E8A-4147-A177-3AD203B41FA5}">
                       <a16:colId xmlns:a16="http://schemas.microsoft.com/office/drawing/2014/main" val="3316237672"/>
@@ -7549,6 +7568,19 @@
                       <a:r>
                         <a:rPr lang="en-US" dirty="0"/>
                         <a:t>Propensity Matching</a:t>
+                      </a:r>
+                    </a:p>
+                  </a:txBody>
+                  <a:tcPr/>
+                </a:tc>
+                <a:tc>
+                  <a:txBody>
+                    <a:bodyPr/>
+                    <a:lstStyle/>
+                    <a:p>
+                      <a:r>
+                        <a:rPr lang="en-US" dirty="0"/>
+                        <a:t>Regression</a:t>
                       </a:r>
                     </a:p>
                   </a:txBody>
@@ -7631,7 +7663,20 @@
                     <a:bodyPr/>
                     <a:lstStyle/>
                     <a:p>
-                      <a:endParaRPr lang="en-US"/>
+                      <a:endParaRPr lang="en-US" dirty="0"/>
+                    </a:p>
+                  </a:txBody>
+                  <a:tcPr/>
+                </a:tc>
+                <a:tc>
+                  <a:txBody>
+                    <a:bodyPr/>
+                    <a:lstStyle/>
+                    <a:p>
+                      <a:r>
+                        <a:rPr lang="en-US" dirty="0"/>
+                        <a:t>0.331</a:t>
+                      </a:r>
                     </a:p>
                   </a:txBody>
                   <a:tcPr/>
@@ -7700,7 +7745,20 @@
                     <a:bodyPr/>
                     <a:lstStyle/>
                     <a:p>
-                      <a:endParaRPr lang="en-US"/>
+                      <a:endParaRPr lang="en-US" dirty="0"/>
+                    </a:p>
+                  </a:txBody>
+                  <a:tcPr/>
+                </a:tc>
+                <a:tc>
+                  <a:txBody>
+                    <a:bodyPr/>
+                    <a:lstStyle/>
+                    <a:p>
+                      <a:r>
+                        <a:rPr lang="en-US" dirty="0"/>
+                        <a:t>0.395</a:t>
+                      </a:r>
                     </a:p>
                   </a:txBody>
                   <a:tcPr/>
@@ -7769,7 +7827,20 @@
                     <a:bodyPr/>
                     <a:lstStyle/>
                     <a:p>
-                      <a:endParaRPr lang="en-US"/>
+                      <a:endParaRPr lang="en-US" dirty="0"/>
+                    </a:p>
+                  </a:txBody>
+                  <a:tcPr/>
+                </a:tc>
+                <a:tc>
+                  <a:txBody>
+                    <a:bodyPr/>
+                    <a:lstStyle/>
+                    <a:p>
+                      <a:r>
+                        <a:rPr lang="en-US" dirty="0"/>
+                        <a:t>0.276</a:t>
+                      </a:r>
                     </a:p>
                   </a:txBody>
                   <a:tcPr/>
@@ -7860,6 +7931,19 @@
                   </a:txBody>
                   <a:tcPr/>
                 </a:tc>
+                <a:tc>
+                  <a:txBody>
+                    <a:bodyPr/>
+                    <a:lstStyle/>
+                    <a:p>
+                      <a:r>
+                        <a:rPr lang="en-US" dirty="0"/>
+                        <a:t>0.214</a:t>
+                      </a:r>
+                    </a:p>
+                  </a:txBody>
+                  <a:tcPr/>
+                </a:tc>
                 <a:extLst>
                   <a:ext uri="{0D108BD9-81ED-4DB2-BD59-A6C34878D82A}">
                     <a16:rowId xmlns:a16="http://schemas.microsoft.com/office/drawing/2014/main" val="2700486332"/>
@@ -7941,7 +8025,20 @@
                     <a:bodyPr/>
                     <a:lstStyle/>
                     <a:p>
-                      <a:endParaRPr lang="en-US"/>
+                      <a:endParaRPr lang="en-US" dirty="0"/>
+                    </a:p>
+                  </a:txBody>
+                  <a:tcPr/>
+                </a:tc>
+                <a:tc>
+                  <a:txBody>
+                    <a:bodyPr/>
+                    <a:lstStyle/>
+                    <a:p>
+                      <a:r>
+                        <a:rPr lang="en-US" dirty="0"/>
+                        <a:t>0.191</a:t>
+                      </a:r>
                     </a:p>
                   </a:txBody>
                   <a:tcPr/>
@@ -7971,7 +8068,10 @@
                     <a:bodyPr/>
                     <a:lstStyle/>
                     <a:p>
-                      <a:endParaRPr lang="en-US"/>
+                      <a:r>
+                        <a:rPr lang="en-US" dirty="0"/>
+                        <a:t>0.017</a:t>
+                      </a:r>
                     </a:p>
                   </a:txBody>
                   <a:tcPr/>
@@ -7981,17 +8081,10 @@
                     <a:bodyPr/>
                     <a:lstStyle/>
                     <a:p>
-                      <a:endParaRPr lang="en-US"/>
-                    </a:p>
-                  </a:txBody>
-                  <a:tcPr/>
-                </a:tc>
-                <a:tc>
-                  <a:txBody>
-                    <a:bodyPr/>
-                    <a:lstStyle/>
-                    <a:p>
-                      <a:endParaRPr lang="en-US"/>
+                      <a:r>
+                        <a:rPr lang="en-US" dirty="0"/>
+                        <a:t>0.005</a:t>
+                      </a:r>
                     </a:p>
                   </a:txBody>
                   <a:tcPr/>
@@ -8002,6 +8095,52 @@
                     <a:lstStyle/>
                     <a:p>
                       <a:endParaRPr lang="en-US" dirty="0"/>
+                    </a:p>
+                  </a:txBody>
+                  <a:tcPr/>
+                </a:tc>
+                <a:tc>
+                  <a:txBody>
+                    <a:bodyPr/>
+                    <a:lstStyle/>
+                    <a:p>
+                      <a:pPr marL="0" marR="0" lvl="0" indent="0" algn="l" defTabSz="457200" rtl="0" eaLnBrk="1" fontAlgn="auto" latinLnBrk="0" hangingPunct="1">
+                        <a:lnSpc>
+                          <a:spcPct val="100000"/>
+                        </a:lnSpc>
+                        <a:spcBef>
+                          <a:spcPts val="0"/>
+                        </a:spcBef>
+                        <a:spcAft>
+                          <a:spcPts val="0"/>
+                        </a:spcAft>
+                        <a:buClrTx/>
+                        <a:buSzTx/>
+                        <a:buFontTx/>
+                        <a:buNone/>
+                        <a:tabLst/>
+                        <a:defRPr/>
+                      </a:pPr>
+                      <a:r>
+                        <a:rPr lang="en-US" dirty="0"/>
+                        <a:t>0.091</a:t>
+                      </a:r>
+                    </a:p>
+                    <a:p>
+                      <a:endParaRPr lang="en-US" dirty="0"/>
+                    </a:p>
+                  </a:txBody>
+                  <a:tcPr/>
+                </a:tc>
+                <a:tc>
+                  <a:txBody>
+                    <a:bodyPr/>
+                    <a:lstStyle/>
+                    <a:p>
+                      <a:r>
+                        <a:rPr lang="en-US" dirty="0"/>
+                        <a:t>0.113</a:t>
+                      </a:r>
                     </a:p>
                   </a:txBody>
                   <a:tcPr/>
@@ -8107,14 +8246,14 @@
             <p:ph idx="1"/>
             <p:extLst>
               <p:ext uri="{D42A27DB-BD31-4B8C-83A1-F6EECF244321}">
-                <p14:modId xmlns:p14="http://schemas.microsoft.com/office/powerpoint/2010/main" val="226162743"/>
+                <p14:modId xmlns:p14="http://schemas.microsoft.com/office/powerpoint/2010/main" val="1580181882"/>
               </p:ext>
             </p:extLst>
           </p:nvPr>
         </p:nvGraphicFramePr>
         <p:xfrm>
           <a:off x="663431" y="1519084"/>
-          <a:ext cx="11002540" cy="4689984"/>
+          <a:ext cx="11002542" cy="4689984"/>
         </p:xfrm>
         <a:graphic>
           <a:graphicData uri="http://schemas.openxmlformats.org/drawingml/2006/table">
@@ -8123,35 +8262,42 @@
                 <a:tableStyleId>{5C22544A-7EE6-4342-B048-85BDC9FD1C3A}</a:tableStyleId>
               </a:tblPr>
               <a:tblGrid>
-                <a:gridCol w="2200508">
+                <a:gridCol w="1833757">
                   <a:extLst>
                     <a:ext uri="{9D8B030D-6E8A-4147-A177-3AD203B41FA5}">
                       <a16:colId xmlns:a16="http://schemas.microsoft.com/office/drawing/2014/main" val="4172883840"/>
                     </a:ext>
                   </a:extLst>
                 </a:gridCol>
-                <a:gridCol w="2200508">
+                <a:gridCol w="1833757">
                   <a:extLst>
                     <a:ext uri="{9D8B030D-6E8A-4147-A177-3AD203B41FA5}">
                       <a16:colId xmlns:a16="http://schemas.microsoft.com/office/drawing/2014/main" val="1001523375"/>
                     </a:ext>
                   </a:extLst>
                 </a:gridCol>
-                <a:gridCol w="2200508">
+                <a:gridCol w="1833757">
                   <a:extLst>
                     <a:ext uri="{9D8B030D-6E8A-4147-A177-3AD203B41FA5}">
                       <a16:colId xmlns:a16="http://schemas.microsoft.com/office/drawing/2014/main" val="2616206518"/>
                     </a:ext>
                   </a:extLst>
                 </a:gridCol>
-                <a:gridCol w="2200508">
+                <a:gridCol w="1833757">
                   <a:extLst>
                     <a:ext uri="{9D8B030D-6E8A-4147-A177-3AD203B41FA5}">
                       <a16:colId xmlns:a16="http://schemas.microsoft.com/office/drawing/2014/main" val="2559281583"/>
                     </a:ext>
                   </a:extLst>
                 </a:gridCol>
-                <a:gridCol w="2200508">
+                <a:gridCol w="1833757">
+                  <a:extLst>
+                    <a:ext uri="{9D8B030D-6E8A-4147-A177-3AD203B41FA5}">
+                      <a16:colId xmlns:a16="http://schemas.microsoft.com/office/drawing/2014/main" val="3292020684"/>
+                    </a:ext>
+                  </a:extLst>
+                </a:gridCol>
+                <a:gridCol w="1833757">
                   <a:extLst>
                     <a:ext uri="{9D8B030D-6E8A-4147-A177-3AD203B41FA5}">
                       <a16:colId xmlns:a16="http://schemas.microsoft.com/office/drawing/2014/main" val="3316237672"/>
@@ -8207,6 +8353,19 @@
                       <a:r>
                         <a:rPr lang="en-US" dirty="0"/>
                         <a:t>Propensity Matching</a:t>
+                      </a:r>
+                    </a:p>
+                  </a:txBody>
+                  <a:tcPr/>
+                </a:tc>
+                <a:tc>
+                  <a:txBody>
+                    <a:bodyPr/>
+                    <a:lstStyle/>
+                    <a:p>
+                      <a:r>
+                        <a:rPr lang="en-US" dirty="0"/>
+                        <a:t>Regression</a:t>
                       </a:r>
                     </a:p>
                   </a:txBody>
@@ -8294,6 +8453,19 @@
                   </a:txBody>
                   <a:tcPr/>
                 </a:tc>
+                <a:tc>
+                  <a:txBody>
+                    <a:bodyPr/>
+                    <a:lstStyle/>
+                    <a:p>
+                      <a:r>
+                        <a:rPr lang="en-US" dirty="0"/>
+                        <a:t>4.669</a:t>
+                      </a:r>
+                    </a:p>
+                  </a:txBody>
+                  <a:tcPr/>
+                </a:tc>
                 <a:extLst>
                   <a:ext uri="{0D108BD9-81ED-4DB2-BD59-A6C34878D82A}">
                     <a16:rowId xmlns:a16="http://schemas.microsoft.com/office/drawing/2014/main" val="1632148400"/>
@@ -8363,6 +8535,19 @@
                   </a:txBody>
                   <a:tcPr/>
                 </a:tc>
+                <a:tc>
+                  <a:txBody>
+                    <a:bodyPr/>
+                    <a:lstStyle/>
+                    <a:p>
+                      <a:r>
+                        <a:rPr lang="en-US" dirty="0"/>
+                        <a:t>6.74</a:t>
+                      </a:r>
+                    </a:p>
+                  </a:txBody>
+                  <a:tcPr/>
+                </a:tc>
                 <a:extLst>
                   <a:ext uri="{0D108BD9-81ED-4DB2-BD59-A6C34878D82A}">
                     <a16:rowId xmlns:a16="http://schemas.microsoft.com/office/drawing/2014/main" val="1632524358"/>
@@ -8428,6 +8613,19 @@
                     <a:lstStyle/>
                     <a:p>
                       <a:endParaRPr lang="en-US" dirty="0"/>
+                    </a:p>
+                  </a:txBody>
+                  <a:tcPr/>
+                </a:tc>
+                <a:tc>
+                  <a:txBody>
+                    <a:bodyPr/>
+                    <a:lstStyle/>
+                    <a:p>
+                      <a:r>
+                        <a:rPr lang="en-US" dirty="0"/>
+                        <a:t>3.678</a:t>
+                      </a:r>
                     </a:p>
                   </a:txBody>
                   <a:tcPr/>
@@ -8513,7 +8711,20 @@
                     <a:bodyPr/>
                     <a:lstStyle/>
                     <a:p>
-                      <a:endParaRPr lang="en-US"/>
+                      <a:endParaRPr lang="en-US" dirty="0"/>
+                    </a:p>
+                  </a:txBody>
+                  <a:tcPr/>
+                </a:tc>
+                <a:tc>
+                  <a:txBody>
+                    <a:bodyPr/>
+                    <a:lstStyle/>
+                    <a:p>
+                      <a:r>
+                        <a:rPr lang="en-US" dirty="0"/>
+                        <a:t>5.497</a:t>
+                      </a:r>
                     </a:p>
                   </a:txBody>
                   <a:tcPr/>
@@ -8599,7 +8810,20 @@
                     <a:bodyPr/>
                     <a:lstStyle/>
                     <a:p>
-                      <a:endParaRPr lang="en-US"/>
+                      <a:endParaRPr lang="en-US" dirty="0"/>
+                    </a:p>
+                  </a:txBody>
+                  <a:tcPr/>
+                </a:tc>
+                <a:tc>
+                  <a:txBody>
+                    <a:bodyPr/>
+                    <a:lstStyle/>
+                    <a:p>
+                      <a:r>
+                        <a:rPr lang="en-US" dirty="0"/>
+                        <a:t>4.535</a:t>
+                      </a:r>
                     </a:p>
                   </a:txBody>
                   <a:tcPr/>
@@ -8629,7 +8853,23 @@
                     <a:bodyPr/>
                     <a:lstStyle/>
                     <a:p>
-                      <a:endParaRPr lang="en-US" dirty="0"/>
+                      <a:r>
+                        <a:rPr lang="en-US" dirty="0"/>
+                        <a:t>3.625</a:t>
+                      </a:r>
+                    </a:p>
+                  </a:txBody>
+                  <a:tcPr/>
+                </a:tc>
+                <a:tc>
+                  <a:txBody>
+                    <a:bodyPr/>
+                    <a:lstStyle/>
+                    <a:p>
+                      <a:r>
+                        <a:rPr lang="en-US" dirty="0"/>
+                        <a:t>0.014</a:t>
+                      </a:r>
                     </a:p>
                   </a:txBody>
                   <a:tcPr/>
@@ -8649,7 +8889,10 @@
                     <a:bodyPr/>
                     <a:lstStyle/>
                     <a:p>
-                      <a:endParaRPr lang="en-US"/>
+                      <a:r>
+                        <a:rPr lang="en-US" dirty="0"/>
+                        <a:t>1.392</a:t>
+                      </a:r>
                     </a:p>
                   </a:txBody>
                   <a:tcPr/>
@@ -8659,7 +8902,10 @@
                     <a:bodyPr/>
                     <a:lstStyle/>
                     <a:p>
-                      <a:endParaRPr lang="en-US" dirty="0"/>
+                      <a:r>
+                        <a:rPr lang="en-US" dirty="0"/>
+                        <a:t>5.031</a:t>
+                      </a:r>
                     </a:p>
                   </a:txBody>
                   <a:tcPr/>
@@ -8732,7 +8978,12 @@
             <p:ph type="title"/>
           </p:nvPr>
         </p:nvSpPr>
-        <p:spPr/>
+        <p:spPr>
+          <a:xfrm>
+            <a:off x="1141413" y="0"/>
+            <a:ext cx="9905998" cy="810409"/>
+          </a:xfrm>
+        </p:spPr>
         <p:txBody>
           <a:bodyPr/>
           <a:lstStyle/>
@@ -8760,12 +9011,152 @@
             <p:ph idx="1"/>
           </p:nvPr>
         </p:nvSpPr>
-        <p:spPr/>
+        <p:spPr>
+          <a:xfrm>
+            <a:off x="1141413" y="810409"/>
+            <a:ext cx="9905998" cy="2077123"/>
+          </a:xfrm>
+        </p:spPr>
         <p:txBody>
-          <a:bodyPr/>
+          <a:bodyPr>
+            <a:normAutofit/>
+          </a:bodyPr>
           <a:lstStyle/>
           <a:p>
-            <a:endParaRPr lang="en-US"/>
+            <a:pPr marL="0" indent="0">
+              <a:buNone/>
+            </a:pPr>
+            <a:r>
+              <a:rPr lang="en-US" dirty="0"/>
+              <a:t>Our preferred causal inference algorithm is…</a:t>
+            </a:r>
+          </a:p>
+          <a:p>
+            <a:pPr marL="0" indent="0">
+              <a:buNone/>
+            </a:pPr>
+            <a:endParaRPr lang="en-US" dirty="0"/>
+          </a:p>
+          <a:p>
+            <a:pPr marL="0" indent="0" algn="ctr">
+              <a:buNone/>
+            </a:pPr>
+            <a:r>
+              <a:rPr lang="en-US" sz="3400" u="sng" dirty="0"/>
+              <a:t>Weighted Regression with L1 Penalized Logistic Regression Propensity Scoring</a:t>
+            </a:r>
+          </a:p>
+        </p:txBody>
+      </p:sp>
+      <p:sp>
+        <p:nvSpPr>
+          <p:cNvPr id="4" name="TextBox 3">
+            <a:extLst>
+              <a:ext uri="{FF2B5EF4-FFF2-40B4-BE49-F238E27FC236}">
+                <a16:creationId xmlns:a16="http://schemas.microsoft.com/office/drawing/2014/main" id="{7A23B166-4A1C-D843-B71C-ED9DB14182C8}"/>
+              </a:ext>
+            </a:extLst>
+          </p:cNvPr>
+          <p:cNvSpPr txBox="1"/>
+          <p:nvPr/>
+        </p:nvSpPr>
+        <p:spPr>
+          <a:xfrm>
+            <a:off x="1141413" y="3324114"/>
+            <a:ext cx="9905998" cy="2532616"/>
+          </a:xfrm>
+          <a:prstGeom prst="rect">
+            <a:avLst/>
+          </a:prstGeom>
+          <a:noFill/>
+        </p:spPr>
+        <p:txBody>
+          <a:bodyPr wrap="square" rtlCol="0">
+            <a:spAutoFit/>
+          </a:bodyPr>
+          <a:lstStyle/>
+          <a:p>
+            <a:pPr marL="285750" indent="-285750">
+              <a:lnSpc>
+                <a:spcPct val="150000"/>
+              </a:lnSpc>
+              <a:buFont typeface="Arial" panose="020B0604020202020204" pitchFamily="34" charset="0"/>
+              <a:buChar char="•"/>
+            </a:pPr>
+            <a:r>
+              <a:rPr lang="en-US" dirty="0"/>
+              <a:t>Achieved comparable estimates to all other combinations</a:t>
+            </a:r>
+          </a:p>
+          <a:p>
+            <a:pPr marL="285750" indent="-285750">
+              <a:lnSpc>
+                <a:spcPct val="150000"/>
+              </a:lnSpc>
+              <a:buFont typeface="Arial" panose="020B0604020202020204" pitchFamily="34" charset="0"/>
+              <a:buChar char="•"/>
+            </a:pPr>
+            <a:r>
+              <a:rPr lang="en-US" dirty="0"/>
+              <a:t>Achieved best estimate on low-dimensional dataset</a:t>
+            </a:r>
+          </a:p>
+          <a:p>
+            <a:pPr marL="285750" indent="-285750">
+              <a:lnSpc>
+                <a:spcPct val="150000"/>
+              </a:lnSpc>
+              <a:buFont typeface="Arial" panose="020B0604020202020204" pitchFamily="34" charset="0"/>
+              <a:buChar char="•"/>
+            </a:pPr>
+            <a:r>
+              <a:rPr lang="en-US" dirty="0"/>
+              <a:t> Regression itself faster than full matching</a:t>
+            </a:r>
+          </a:p>
+          <a:p>
+            <a:pPr marL="285750" indent="-285750">
+              <a:lnSpc>
+                <a:spcPct val="150000"/>
+              </a:lnSpc>
+              <a:buFont typeface="Arial" panose="020B0604020202020204" pitchFamily="34" charset="0"/>
+              <a:buChar char="•"/>
+            </a:pPr>
+            <a:r>
+              <a:rPr lang="en-US" dirty="0"/>
+              <a:t>Can achieve even faster estimates with different scoring model</a:t>
+            </a:r>
+          </a:p>
+          <a:p>
+            <a:pPr marL="285750" indent="-285750">
+              <a:lnSpc>
+                <a:spcPct val="150000"/>
+              </a:lnSpc>
+              <a:buFont typeface="Arial" panose="020B0604020202020204" pitchFamily="34" charset="0"/>
+              <a:buChar char="•"/>
+            </a:pPr>
+            <a:r>
+              <a:rPr lang="en-US" dirty="0"/>
+              <a:t>Easy to implement</a:t>
+            </a:r>
+          </a:p>
+          <a:p>
+            <a:pPr marL="285750" indent="-285750">
+              <a:lnSpc>
+                <a:spcPct val="150000"/>
+              </a:lnSpc>
+              <a:buFont typeface="Arial" panose="020B0604020202020204" pitchFamily="34" charset="0"/>
+              <a:buChar char="•"/>
+            </a:pPr>
+            <a:r>
+              <a:rPr lang="en-US" dirty="0"/>
+              <a:t>Unlike full matching, does not require </a:t>
+            </a:r>
+            <a:r>
+              <a:rPr lang="en-US"/>
+              <a:t>hyper-parameter tuning</a:t>
+            </a:r>
+            <a:endParaRPr lang="en-US" dirty="0"/>
           </a:p>
         </p:txBody>
       </p:sp>

</xml_diff>